<commit_message>
files already prepared are arranged
</commit_message>
<xml_diff>
--- a/Network/IPSEC.pptx
+++ b/Network/IPSEC.pptx
@@ -260,7 +260,7 @@
           <a:p>
             <a:fld id="{49B2134D-23AA-4A81-B917-18AD91DBBB07}" type="datetimeFigureOut">
               <a:rPr lang="tr-TR" smtClean="0"/>
-              <a:t>25.10.2022</a:t>
+              <a:t>15.11.2022</a:t>
             </a:fld>
             <a:endParaRPr lang="tr-TR"/>
           </a:p>
@@ -430,7 +430,7 @@
           <a:p>
             <a:fld id="{49B2134D-23AA-4A81-B917-18AD91DBBB07}" type="datetimeFigureOut">
               <a:rPr lang="tr-TR" smtClean="0"/>
-              <a:t>25.10.2022</a:t>
+              <a:t>15.11.2022</a:t>
             </a:fld>
             <a:endParaRPr lang="tr-TR"/>
           </a:p>
@@ -610,7 +610,7 @@
           <a:p>
             <a:fld id="{49B2134D-23AA-4A81-B917-18AD91DBBB07}" type="datetimeFigureOut">
               <a:rPr lang="tr-TR" smtClean="0"/>
-              <a:t>25.10.2022</a:t>
+              <a:t>15.11.2022</a:t>
             </a:fld>
             <a:endParaRPr lang="tr-TR"/>
           </a:p>
@@ -780,7 +780,7 @@
           <a:p>
             <a:fld id="{49B2134D-23AA-4A81-B917-18AD91DBBB07}" type="datetimeFigureOut">
               <a:rPr lang="tr-TR" smtClean="0"/>
-              <a:t>25.10.2022</a:t>
+              <a:t>15.11.2022</a:t>
             </a:fld>
             <a:endParaRPr lang="tr-TR"/>
           </a:p>
@@ -1026,7 +1026,7 @@
           <a:p>
             <a:fld id="{49B2134D-23AA-4A81-B917-18AD91DBBB07}" type="datetimeFigureOut">
               <a:rPr lang="tr-TR" smtClean="0"/>
-              <a:t>25.10.2022</a:t>
+              <a:t>15.11.2022</a:t>
             </a:fld>
             <a:endParaRPr lang="tr-TR"/>
           </a:p>
@@ -1258,7 +1258,7 @@
           <a:p>
             <a:fld id="{49B2134D-23AA-4A81-B917-18AD91DBBB07}" type="datetimeFigureOut">
               <a:rPr lang="tr-TR" smtClean="0"/>
-              <a:t>25.10.2022</a:t>
+              <a:t>15.11.2022</a:t>
             </a:fld>
             <a:endParaRPr lang="tr-TR"/>
           </a:p>
@@ -1625,7 +1625,7 @@
           <a:p>
             <a:fld id="{49B2134D-23AA-4A81-B917-18AD91DBBB07}" type="datetimeFigureOut">
               <a:rPr lang="tr-TR" smtClean="0"/>
-              <a:t>25.10.2022</a:t>
+              <a:t>15.11.2022</a:t>
             </a:fld>
             <a:endParaRPr lang="tr-TR"/>
           </a:p>
@@ -1743,7 +1743,7 @@
           <a:p>
             <a:fld id="{49B2134D-23AA-4A81-B917-18AD91DBBB07}" type="datetimeFigureOut">
               <a:rPr lang="tr-TR" smtClean="0"/>
-              <a:t>25.10.2022</a:t>
+              <a:t>15.11.2022</a:t>
             </a:fld>
             <a:endParaRPr lang="tr-TR"/>
           </a:p>
@@ -1838,7 +1838,7 @@
           <a:p>
             <a:fld id="{49B2134D-23AA-4A81-B917-18AD91DBBB07}" type="datetimeFigureOut">
               <a:rPr lang="tr-TR" smtClean="0"/>
-              <a:t>25.10.2022</a:t>
+              <a:t>15.11.2022</a:t>
             </a:fld>
             <a:endParaRPr lang="tr-TR"/>
           </a:p>
@@ -2115,7 +2115,7 @@
           <a:p>
             <a:fld id="{49B2134D-23AA-4A81-B917-18AD91DBBB07}" type="datetimeFigureOut">
               <a:rPr lang="tr-TR" smtClean="0"/>
-              <a:t>25.10.2022</a:t>
+              <a:t>15.11.2022</a:t>
             </a:fld>
             <a:endParaRPr lang="tr-TR"/>
           </a:p>
@@ -2368,7 +2368,7 @@
           <a:p>
             <a:fld id="{49B2134D-23AA-4A81-B917-18AD91DBBB07}" type="datetimeFigureOut">
               <a:rPr lang="tr-TR" smtClean="0"/>
-              <a:t>25.10.2022</a:t>
+              <a:t>15.11.2022</a:t>
             </a:fld>
             <a:endParaRPr lang="tr-TR"/>
           </a:p>
@@ -2581,7 +2581,7 @@
           <a:p>
             <a:fld id="{49B2134D-23AA-4A81-B917-18AD91DBBB07}" type="datetimeFigureOut">
               <a:rPr lang="tr-TR" smtClean="0"/>
-              <a:t>25.10.2022</a:t>
+              <a:t>15.11.2022</a:t>
             </a:fld>
             <a:endParaRPr lang="tr-TR"/>
           </a:p>
@@ -4236,11 +4236,7 @@
             </a:r>
             <a:r>
               <a:rPr lang="en-US" sz="2000" dirty="0"/>
-              <a:t>, is computed on the entire ESP packet, excluding the Authentication Data field. </a:t>
-            </a:r>
-            <a:r>
-              <a:rPr lang="en-US" sz="2000" dirty="0"/>
-              <a:t>This includes the </a:t>
+              <a:t>, is computed on the entire ESP packet, excluding the Authentication Data field. This includes the </a:t>
             </a:r>
             <a:r>
               <a:rPr lang="en-US" sz="2000" b="1" dirty="0"/>
@@ -4314,11 +4310,7 @@
           <a:p>
             <a:r>
               <a:rPr lang="en-US" sz="2000" dirty="0"/>
-              <a:t>When the packet is received, its content, excluding some fields, is hashed by the receiver and the result is compared with the ICV. </a:t>
-            </a:r>
-            <a:r>
-              <a:rPr lang="en-US" sz="2000" dirty="0"/>
-              <a:t>If they are the same, the packet is declared authentic</a:t>
+              <a:t>When the packet is received, its content, excluding some fields, is hashed by the receiver and the result is compared with the ICV. If they are the same, the packet is declared authentic</a:t>
             </a:r>
             <a:r>
               <a:rPr lang="en-US" sz="2000" dirty="0" smtClean="0"/>
@@ -4414,11 +4406,7 @@
           <a:p>
             <a:r>
               <a:rPr lang="en-US" sz="2000" dirty="0"/>
-              <a:t>An initialization vector (IV) is an arbitrary number that can be used with a secret key for data encryption to foil cyber </a:t>
-            </a:r>
-            <a:r>
-              <a:rPr lang="en-US" sz="2000" dirty="0"/>
-              <a:t>attacks.</a:t>
+              <a:t>An initialization vector (IV) is an arbitrary number that can be used with a secret key for data encryption to foil cyber attacks.</a:t>
             </a:r>
           </a:p>
           <a:p>
@@ -4885,11 +4873,7 @@
             </a:r>
             <a:r>
               <a:rPr lang="en-US" sz="2000" dirty="0"/>
-              <a:t>use of an IV prevents the repetition of a sequence of text in data encryption</a:t>
-            </a:r>
-            <a:r>
-              <a:rPr lang="en-US" sz="2000" dirty="0"/>
-              <a:t>.</a:t>
+              <a:t>use of an IV prevents the repetition of a sequence of text in data encryption.</a:t>
             </a:r>
           </a:p>
           <a:p>

</xml_diff>